<commit_message>
Node color code again
</commit_message>
<xml_diff>
--- a/Images/Color_Code_for_Node_Degree.pptx
+++ b/Images/Color_Code_for_Node_Degree.pptx
@@ -2,13 +2,14 @@
 <file path=ppt/presentation.xml><?xml version="1.0" encoding="utf-8"?>
 <p:presentation xmlns:a="http://schemas.openxmlformats.org/drawingml/2006/main" xmlns:r="http://schemas.openxmlformats.org/officeDocument/2006/relationships" xmlns:p="http://schemas.openxmlformats.org/presentationml/2006/main" saveSubsetFonts="1">
   <p:sldMasterIdLst>
-    <p:sldMasterId id="2147483696" r:id="rId1"/>
+    <p:sldMasterId id="2147483732" r:id="rId1"/>
   </p:sldMasterIdLst>
   <p:sldIdLst>
     <p:sldId id="256" r:id="rId2"/>
-    <p:sldId id="257" r:id="rId3"/>
+    <p:sldId id="258" r:id="rId3"/>
+    <p:sldId id="257" r:id="rId4"/>
   </p:sldIdLst>
-  <p:sldSz cx="8229600" cy="3200400"/>
+  <p:sldSz cx="7315200" cy="2286000"/>
   <p:notesSz cx="6858000" cy="9144000"/>
   <p:defaultTextStyle>
     <a:defPPr>
@@ -105,6 +106,11 @@
       </a:defRPr>
     </a:lvl9pPr>
   </p:defaultTextStyle>
+  <p:extLst>
+    <p:ext uri="{EFAFB233-063F-42B5-8137-9DF3F51BA10A}">
+      <p15:sldGuideLst xmlns:p15="http://schemas.microsoft.com/office/powerpoint/2012/main"/>
+    </p:ext>
+  </p:extLst>
 </p:presentation>
 </file>
 
@@ -137,15 +143,15 @@
         </p:nvSpPr>
         <p:spPr>
           <a:xfrm>
-            <a:off x="1028700" y="523770"/>
-            <a:ext cx="6172200" cy="1114213"/>
+            <a:off x="914400" y="374121"/>
+            <a:ext cx="5486400" cy="795867"/>
           </a:xfrm>
         </p:spPr>
         <p:txBody>
           <a:bodyPr anchor="b"/>
           <a:lstStyle>
             <a:lvl1pPr algn="ctr">
-              <a:defRPr sz="2800"/>
+              <a:defRPr sz="2000"/>
             </a:lvl1pPr>
           </a:lstStyle>
           <a:p>
@@ -169,8 +175,8 @@
         </p:nvSpPr>
         <p:spPr>
           <a:xfrm>
-            <a:off x="1028700" y="1680951"/>
-            <a:ext cx="6172200" cy="772689"/>
+            <a:off x="914400" y="1200679"/>
+            <a:ext cx="5486400" cy="551921"/>
           </a:xfrm>
         </p:spPr>
         <p:txBody>
@@ -178,39 +184,39 @@
           <a:lstStyle>
             <a:lvl1pPr marL="0" indent="0" algn="ctr">
               <a:buNone/>
-              <a:defRPr sz="1120"/>
+              <a:defRPr sz="800"/>
             </a:lvl1pPr>
-            <a:lvl2pPr marL="213375" indent="0" algn="ctr">
-              <a:buNone/>
-              <a:defRPr sz="933"/>
+            <a:lvl2pPr marL="152385" indent="0" algn="ctr">
+              <a:buNone/>
+              <a:defRPr sz="667"/>
             </a:lvl2pPr>
-            <a:lvl3pPr marL="426750" indent="0" algn="ctr">
-              <a:buNone/>
-              <a:defRPr sz="840"/>
+            <a:lvl3pPr marL="304770" indent="0" algn="ctr">
+              <a:buNone/>
+              <a:defRPr sz="600"/>
             </a:lvl3pPr>
-            <a:lvl4pPr marL="640126" indent="0" algn="ctr">
-              <a:buNone/>
-              <a:defRPr sz="747"/>
+            <a:lvl4pPr marL="457154" indent="0" algn="ctr">
+              <a:buNone/>
+              <a:defRPr sz="533"/>
             </a:lvl4pPr>
-            <a:lvl5pPr marL="853501" indent="0" algn="ctr">
-              <a:buNone/>
-              <a:defRPr sz="747"/>
+            <a:lvl5pPr marL="609539" indent="0" algn="ctr">
+              <a:buNone/>
+              <a:defRPr sz="533"/>
             </a:lvl5pPr>
-            <a:lvl6pPr marL="1066876" indent="0" algn="ctr">
-              <a:buNone/>
-              <a:defRPr sz="747"/>
+            <a:lvl6pPr marL="761924" indent="0" algn="ctr">
+              <a:buNone/>
+              <a:defRPr sz="533"/>
             </a:lvl6pPr>
-            <a:lvl7pPr marL="1280251" indent="0" algn="ctr">
-              <a:buNone/>
-              <a:defRPr sz="747"/>
+            <a:lvl7pPr marL="914309" indent="0" algn="ctr">
+              <a:buNone/>
+              <a:defRPr sz="533"/>
             </a:lvl7pPr>
-            <a:lvl8pPr marL="1493627" indent="0" algn="ctr">
-              <a:buNone/>
-              <a:defRPr sz="747"/>
+            <a:lvl8pPr marL="1066693" indent="0" algn="ctr">
+              <a:buNone/>
+              <a:defRPr sz="533"/>
             </a:lvl8pPr>
-            <a:lvl9pPr marL="1707002" indent="0" algn="ctr">
-              <a:buNone/>
-              <a:defRPr sz="747"/>
+            <a:lvl9pPr marL="1219078" indent="0" algn="ctr">
+              <a:buNone/>
+              <a:defRPr sz="533"/>
             </a:lvl9pPr>
           </a:lstStyle>
           <a:p>
@@ -239,7 +245,7 @@
           <a:p>
             <a:fld id="{784600EB-327D-4924-BA30-06E361308E99}" type="datetimeFigureOut">
               <a:rPr lang="en-US" smtClean="0"/>
-              <a:t>12/22/2020</a:t>
+              <a:t>12/23/2020</a:t>
             </a:fld>
             <a:endParaRPr lang="en-US"/>
           </a:p>
@@ -290,7 +296,7 @@
     </p:spTree>
     <p:extLst>
       <p:ext uri="{BB962C8B-B14F-4D97-AF65-F5344CB8AC3E}">
-        <p14:creationId xmlns:p14="http://schemas.microsoft.com/office/powerpoint/2010/main" val="2229726922"/>
+        <p14:creationId xmlns:p14="http://schemas.microsoft.com/office/powerpoint/2010/main" val="3786188117"/>
       </p:ext>
     </p:extLst>
   </p:cSld>
@@ -409,7 +415,7 @@
           <a:p>
             <a:fld id="{784600EB-327D-4924-BA30-06E361308E99}" type="datetimeFigureOut">
               <a:rPr lang="en-US" smtClean="0"/>
-              <a:t>12/22/2020</a:t>
+              <a:t>12/23/2020</a:t>
             </a:fld>
             <a:endParaRPr lang="en-US"/>
           </a:p>
@@ -460,7 +466,7 @@
     </p:spTree>
     <p:extLst>
       <p:ext uri="{BB962C8B-B14F-4D97-AF65-F5344CB8AC3E}">
-        <p14:creationId xmlns:p14="http://schemas.microsoft.com/office/powerpoint/2010/main" val="399225174"/>
+        <p14:creationId xmlns:p14="http://schemas.microsoft.com/office/powerpoint/2010/main" val="663106241"/>
       </p:ext>
     </p:extLst>
   </p:cSld>
@@ -499,8 +505,8 @@
         </p:nvSpPr>
         <p:spPr>
           <a:xfrm>
-            <a:off x="5889307" y="170392"/>
-            <a:ext cx="1774508" cy="2712191"/>
+            <a:off x="5234940" y="121709"/>
+            <a:ext cx="1577340" cy="1937279"/>
           </a:xfrm>
         </p:spPr>
         <p:txBody>
@@ -527,8 +533,8 @@
         </p:nvSpPr>
         <p:spPr>
           <a:xfrm>
-            <a:off x="565785" y="170392"/>
-            <a:ext cx="5220653" cy="2712191"/>
+            <a:off x="502920" y="121709"/>
+            <a:ext cx="4640580" cy="1937279"/>
           </a:xfrm>
         </p:spPr>
         <p:txBody>
@@ -589,7 +595,7 @@
           <a:p>
             <a:fld id="{784600EB-327D-4924-BA30-06E361308E99}" type="datetimeFigureOut">
               <a:rPr lang="en-US" smtClean="0"/>
-              <a:t>12/22/2020</a:t>
+              <a:t>12/23/2020</a:t>
             </a:fld>
             <a:endParaRPr lang="en-US"/>
           </a:p>
@@ -640,7 +646,7 @@
     </p:spTree>
     <p:extLst>
       <p:ext uri="{BB962C8B-B14F-4D97-AF65-F5344CB8AC3E}">
-        <p14:creationId xmlns:p14="http://schemas.microsoft.com/office/powerpoint/2010/main" val="734803100"/>
+        <p14:creationId xmlns:p14="http://schemas.microsoft.com/office/powerpoint/2010/main" val="436994794"/>
       </p:ext>
     </p:extLst>
   </p:cSld>
@@ -759,7 +765,7 @@
           <a:p>
             <a:fld id="{784600EB-327D-4924-BA30-06E361308E99}" type="datetimeFigureOut">
               <a:rPr lang="en-US" smtClean="0"/>
-              <a:t>12/22/2020</a:t>
+              <a:t>12/23/2020</a:t>
             </a:fld>
             <a:endParaRPr lang="en-US"/>
           </a:p>
@@ -810,7 +816,7 @@
     </p:spTree>
     <p:extLst>
       <p:ext uri="{BB962C8B-B14F-4D97-AF65-F5344CB8AC3E}">
-        <p14:creationId xmlns:p14="http://schemas.microsoft.com/office/powerpoint/2010/main" val="3869404030"/>
+        <p14:creationId xmlns:p14="http://schemas.microsoft.com/office/powerpoint/2010/main" val="3614078601"/>
       </p:ext>
     </p:extLst>
   </p:cSld>
@@ -849,15 +855,15 @@
         </p:nvSpPr>
         <p:spPr>
           <a:xfrm>
-            <a:off x="561499" y="797878"/>
-            <a:ext cx="7098030" cy="1331277"/>
+            <a:off x="499110" y="569913"/>
+            <a:ext cx="6309360" cy="950912"/>
           </a:xfrm>
         </p:spPr>
         <p:txBody>
           <a:bodyPr anchor="b"/>
           <a:lstStyle>
             <a:lvl1pPr>
-              <a:defRPr sz="2800"/>
+              <a:defRPr sz="2000"/>
             </a:lvl1pPr>
           </a:lstStyle>
           <a:p>
@@ -881,8 +887,8 @@
         </p:nvSpPr>
         <p:spPr>
           <a:xfrm>
-            <a:off x="561499" y="2141750"/>
-            <a:ext cx="7098030" cy="700087"/>
+            <a:off x="499110" y="1529821"/>
+            <a:ext cx="6309360" cy="500062"/>
           </a:xfrm>
         </p:spPr>
         <p:txBody>
@@ -890,7 +896,7 @@
           <a:lstStyle>
             <a:lvl1pPr marL="0" indent="0">
               <a:buNone/>
-              <a:defRPr sz="1120">
+              <a:defRPr sz="800">
                 <a:solidFill>
                   <a:schemeClr val="tx1">
                     <a:tint val="75000"/>
@@ -898,9 +904,9 @@
                 </a:solidFill>
               </a:defRPr>
             </a:lvl1pPr>
-            <a:lvl2pPr marL="213375" indent="0">
-              <a:buNone/>
-              <a:defRPr sz="933">
+            <a:lvl2pPr marL="152385" indent="0">
+              <a:buNone/>
+              <a:defRPr sz="667">
                 <a:solidFill>
                   <a:schemeClr val="tx1">
                     <a:tint val="75000"/>
@@ -908,9 +914,9 @@
                 </a:solidFill>
               </a:defRPr>
             </a:lvl2pPr>
-            <a:lvl3pPr marL="426750" indent="0">
-              <a:buNone/>
-              <a:defRPr sz="840">
+            <a:lvl3pPr marL="304770" indent="0">
+              <a:buNone/>
+              <a:defRPr sz="600">
                 <a:solidFill>
                   <a:schemeClr val="tx1">
                     <a:tint val="75000"/>
@@ -918,9 +924,9 @@
                 </a:solidFill>
               </a:defRPr>
             </a:lvl3pPr>
-            <a:lvl4pPr marL="640126" indent="0">
-              <a:buNone/>
-              <a:defRPr sz="747">
+            <a:lvl4pPr marL="457154" indent="0">
+              <a:buNone/>
+              <a:defRPr sz="533">
                 <a:solidFill>
                   <a:schemeClr val="tx1">
                     <a:tint val="75000"/>
@@ -928,9 +934,9 @@
                 </a:solidFill>
               </a:defRPr>
             </a:lvl4pPr>
-            <a:lvl5pPr marL="853501" indent="0">
-              <a:buNone/>
-              <a:defRPr sz="747">
+            <a:lvl5pPr marL="609539" indent="0">
+              <a:buNone/>
+              <a:defRPr sz="533">
                 <a:solidFill>
                   <a:schemeClr val="tx1">
                     <a:tint val="75000"/>
@@ -938,9 +944,9 @@
                 </a:solidFill>
               </a:defRPr>
             </a:lvl5pPr>
-            <a:lvl6pPr marL="1066876" indent="0">
-              <a:buNone/>
-              <a:defRPr sz="747">
+            <a:lvl6pPr marL="761924" indent="0">
+              <a:buNone/>
+              <a:defRPr sz="533">
                 <a:solidFill>
                   <a:schemeClr val="tx1">
                     <a:tint val="75000"/>
@@ -948,9 +954,9 @@
                 </a:solidFill>
               </a:defRPr>
             </a:lvl6pPr>
-            <a:lvl7pPr marL="1280251" indent="0">
-              <a:buNone/>
-              <a:defRPr sz="747">
+            <a:lvl7pPr marL="914309" indent="0">
+              <a:buNone/>
+              <a:defRPr sz="533">
                 <a:solidFill>
                   <a:schemeClr val="tx1">
                     <a:tint val="75000"/>
@@ -958,9 +964,9 @@
                 </a:solidFill>
               </a:defRPr>
             </a:lvl7pPr>
-            <a:lvl8pPr marL="1493627" indent="0">
-              <a:buNone/>
-              <a:defRPr sz="747">
+            <a:lvl8pPr marL="1066693" indent="0">
+              <a:buNone/>
+              <a:defRPr sz="533">
                 <a:solidFill>
                   <a:schemeClr val="tx1">
                     <a:tint val="75000"/>
@@ -968,9 +974,9 @@
                 </a:solidFill>
               </a:defRPr>
             </a:lvl8pPr>
-            <a:lvl9pPr marL="1707002" indent="0">
-              <a:buNone/>
-              <a:defRPr sz="747">
+            <a:lvl9pPr marL="1219078" indent="0">
+              <a:buNone/>
+              <a:defRPr sz="533">
                 <a:solidFill>
                   <a:schemeClr val="tx1">
                     <a:tint val="75000"/>
@@ -1005,7 +1011,7 @@
           <a:p>
             <a:fld id="{784600EB-327D-4924-BA30-06E361308E99}" type="datetimeFigureOut">
               <a:rPr lang="en-US" smtClean="0"/>
-              <a:t>12/22/2020</a:t>
+              <a:t>12/23/2020</a:t>
             </a:fld>
             <a:endParaRPr lang="en-US"/>
           </a:p>
@@ -1056,7 +1062,7 @@
     </p:spTree>
     <p:extLst>
       <p:ext uri="{BB962C8B-B14F-4D97-AF65-F5344CB8AC3E}">
-        <p14:creationId xmlns:p14="http://schemas.microsoft.com/office/powerpoint/2010/main" val="405373212"/>
+        <p14:creationId xmlns:p14="http://schemas.microsoft.com/office/powerpoint/2010/main" val="561440240"/>
       </p:ext>
     </p:extLst>
   </p:cSld>
@@ -1118,8 +1124,8 @@
         </p:nvSpPr>
         <p:spPr>
           <a:xfrm>
-            <a:off x="565785" y="851959"/>
-            <a:ext cx="3497580" cy="2030624"/>
+            <a:off x="502920" y="608542"/>
+            <a:ext cx="3108960" cy="1450446"/>
           </a:xfrm>
         </p:spPr>
         <p:txBody>
@@ -1175,8 +1181,8 @@
         </p:nvSpPr>
         <p:spPr>
           <a:xfrm>
-            <a:off x="4166235" y="851959"/>
-            <a:ext cx="3497580" cy="2030624"/>
+            <a:off x="3703320" y="608542"/>
+            <a:ext cx="3108960" cy="1450446"/>
           </a:xfrm>
         </p:spPr>
         <p:txBody>
@@ -1237,7 +1243,7 @@
           <a:p>
             <a:fld id="{784600EB-327D-4924-BA30-06E361308E99}" type="datetimeFigureOut">
               <a:rPr lang="en-US" smtClean="0"/>
-              <a:t>12/22/2020</a:t>
+              <a:t>12/23/2020</a:t>
             </a:fld>
             <a:endParaRPr lang="en-US"/>
           </a:p>
@@ -1288,7 +1294,7 @@
     </p:spTree>
     <p:extLst>
       <p:ext uri="{BB962C8B-B14F-4D97-AF65-F5344CB8AC3E}">
-        <p14:creationId xmlns:p14="http://schemas.microsoft.com/office/powerpoint/2010/main" val="3459450887"/>
+        <p14:creationId xmlns:p14="http://schemas.microsoft.com/office/powerpoint/2010/main" val="3803956512"/>
       </p:ext>
     </p:extLst>
   </p:cSld>
@@ -1327,8 +1333,8 @@
         </p:nvSpPr>
         <p:spPr>
           <a:xfrm>
-            <a:off x="566857" y="170392"/>
-            <a:ext cx="7098030" cy="618596"/>
+            <a:off x="503873" y="121709"/>
+            <a:ext cx="6309360" cy="441854"/>
           </a:xfrm>
         </p:spPr>
         <p:txBody>
@@ -1355,8 +1361,8 @@
         </p:nvSpPr>
         <p:spPr>
           <a:xfrm>
-            <a:off x="566857" y="784543"/>
-            <a:ext cx="3481506" cy="384492"/>
+            <a:off x="503873" y="560388"/>
+            <a:ext cx="3094672" cy="274637"/>
           </a:xfrm>
         </p:spPr>
         <p:txBody>
@@ -1364,39 +1370,39 @@
           <a:lstStyle>
             <a:lvl1pPr marL="0" indent="0">
               <a:buNone/>
-              <a:defRPr sz="1120" b="1"/>
+              <a:defRPr sz="800" b="1"/>
             </a:lvl1pPr>
-            <a:lvl2pPr marL="213375" indent="0">
-              <a:buNone/>
-              <a:defRPr sz="933" b="1"/>
+            <a:lvl2pPr marL="152385" indent="0">
+              <a:buNone/>
+              <a:defRPr sz="667" b="1"/>
             </a:lvl2pPr>
-            <a:lvl3pPr marL="426750" indent="0">
-              <a:buNone/>
-              <a:defRPr sz="840" b="1"/>
+            <a:lvl3pPr marL="304770" indent="0">
+              <a:buNone/>
+              <a:defRPr sz="600" b="1"/>
             </a:lvl3pPr>
-            <a:lvl4pPr marL="640126" indent="0">
-              <a:buNone/>
-              <a:defRPr sz="747" b="1"/>
+            <a:lvl4pPr marL="457154" indent="0">
+              <a:buNone/>
+              <a:defRPr sz="533" b="1"/>
             </a:lvl4pPr>
-            <a:lvl5pPr marL="853501" indent="0">
-              <a:buNone/>
-              <a:defRPr sz="747" b="1"/>
+            <a:lvl5pPr marL="609539" indent="0">
+              <a:buNone/>
+              <a:defRPr sz="533" b="1"/>
             </a:lvl5pPr>
-            <a:lvl6pPr marL="1066876" indent="0">
-              <a:buNone/>
-              <a:defRPr sz="747" b="1"/>
+            <a:lvl6pPr marL="761924" indent="0">
+              <a:buNone/>
+              <a:defRPr sz="533" b="1"/>
             </a:lvl6pPr>
-            <a:lvl7pPr marL="1280251" indent="0">
-              <a:buNone/>
-              <a:defRPr sz="747" b="1"/>
+            <a:lvl7pPr marL="914309" indent="0">
+              <a:buNone/>
+              <a:defRPr sz="533" b="1"/>
             </a:lvl7pPr>
-            <a:lvl8pPr marL="1493627" indent="0">
-              <a:buNone/>
-              <a:defRPr sz="747" b="1"/>
+            <a:lvl8pPr marL="1066693" indent="0">
+              <a:buNone/>
+              <a:defRPr sz="533" b="1"/>
             </a:lvl8pPr>
-            <a:lvl9pPr marL="1707002" indent="0">
-              <a:buNone/>
-              <a:defRPr sz="747" b="1"/>
+            <a:lvl9pPr marL="1219078" indent="0">
+              <a:buNone/>
+              <a:defRPr sz="533" b="1"/>
             </a:lvl9pPr>
           </a:lstStyle>
           <a:p>
@@ -1420,8 +1426,8 @@
         </p:nvSpPr>
         <p:spPr>
           <a:xfrm>
-            <a:off x="566857" y="1169035"/>
-            <a:ext cx="3481506" cy="1719474"/>
+            <a:off x="503873" y="835025"/>
+            <a:ext cx="3094672" cy="1228196"/>
           </a:xfrm>
         </p:spPr>
         <p:txBody>
@@ -1477,8 +1483,8 @@
         </p:nvSpPr>
         <p:spPr>
           <a:xfrm>
-            <a:off x="4166235" y="784543"/>
-            <a:ext cx="3498652" cy="384492"/>
+            <a:off x="3703320" y="560388"/>
+            <a:ext cx="3109913" cy="274637"/>
           </a:xfrm>
         </p:spPr>
         <p:txBody>
@@ -1486,39 +1492,39 @@
           <a:lstStyle>
             <a:lvl1pPr marL="0" indent="0">
               <a:buNone/>
-              <a:defRPr sz="1120" b="1"/>
+              <a:defRPr sz="800" b="1"/>
             </a:lvl1pPr>
-            <a:lvl2pPr marL="213375" indent="0">
-              <a:buNone/>
-              <a:defRPr sz="933" b="1"/>
+            <a:lvl2pPr marL="152385" indent="0">
+              <a:buNone/>
+              <a:defRPr sz="667" b="1"/>
             </a:lvl2pPr>
-            <a:lvl3pPr marL="426750" indent="0">
-              <a:buNone/>
-              <a:defRPr sz="840" b="1"/>
+            <a:lvl3pPr marL="304770" indent="0">
+              <a:buNone/>
+              <a:defRPr sz="600" b="1"/>
             </a:lvl3pPr>
-            <a:lvl4pPr marL="640126" indent="0">
-              <a:buNone/>
-              <a:defRPr sz="747" b="1"/>
+            <a:lvl4pPr marL="457154" indent="0">
+              <a:buNone/>
+              <a:defRPr sz="533" b="1"/>
             </a:lvl4pPr>
-            <a:lvl5pPr marL="853501" indent="0">
-              <a:buNone/>
-              <a:defRPr sz="747" b="1"/>
+            <a:lvl5pPr marL="609539" indent="0">
+              <a:buNone/>
+              <a:defRPr sz="533" b="1"/>
             </a:lvl5pPr>
-            <a:lvl6pPr marL="1066876" indent="0">
-              <a:buNone/>
-              <a:defRPr sz="747" b="1"/>
+            <a:lvl6pPr marL="761924" indent="0">
+              <a:buNone/>
+              <a:defRPr sz="533" b="1"/>
             </a:lvl6pPr>
-            <a:lvl7pPr marL="1280251" indent="0">
-              <a:buNone/>
-              <a:defRPr sz="747" b="1"/>
+            <a:lvl7pPr marL="914309" indent="0">
+              <a:buNone/>
+              <a:defRPr sz="533" b="1"/>
             </a:lvl7pPr>
-            <a:lvl8pPr marL="1493627" indent="0">
-              <a:buNone/>
-              <a:defRPr sz="747" b="1"/>
+            <a:lvl8pPr marL="1066693" indent="0">
+              <a:buNone/>
+              <a:defRPr sz="533" b="1"/>
             </a:lvl8pPr>
-            <a:lvl9pPr marL="1707002" indent="0">
-              <a:buNone/>
-              <a:defRPr sz="747" b="1"/>
+            <a:lvl9pPr marL="1219078" indent="0">
+              <a:buNone/>
+              <a:defRPr sz="533" b="1"/>
             </a:lvl9pPr>
           </a:lstStyle>
           <a:p>
@@ -1542,8 +1548,8 @@
         </p:nvSpPr>
         <p:spPr>
           <a:xfrm>
-            <a:off x="4166235" y="1169035"/>
-            <a:ext cx="3498652" cy="1719474"/>
+            <a:off x="3703320" y="835025"/>
+            <a:ext cx="3109913" cy="1228196"/>
           </a:xfrm>
         </p:spPr>
         <p:txBody>
@@ -1604,7 +1610,7 @@
           <a:p>
             <a:fld id="{784600EB-327D-4924-BA30-06E361308E99}" type="datetimeFigureOut">
               <a:rPr lang="en-US" smtClean="0"/>
-              <a:t>12/22/2020</a:t>
+              <a:t>12/23/2020</a:t>
             </a:fld>
             <a:endParaRPr lang="en-US"/>
           </a:p>
@@ -1655,7 +1661,7 @@
     </p:spTree>
     <p:extLst>
       <p:ext uri="{BB962C8B-B14F-4D97-AF65-F5344CB8AC3E}">
-        <p14:creationId xmlns:p14="http://schemas.microsoft.com/office/powerpoint/2010/main" val="2703770935"/>
+        <p14:creationId xmlns:p14="http://schemas.microsoft.com/office/powerpoint/2010/main" val="311018045"/>
       </p:ext>
     </p:extLst>
   </p:cSld>
@@ -1722,7 +1728,7 @@
           <a:p>
             <a:fld id="{784600EB-327D-4924-BA30-06E361308E99}" type="datetimeFigureOut">
               <a:rPr lang="en-US" smtClean="0"/>
-              <a:t>12/22/2020</a:t>
+              <a:t>12/23/2020</a:t>
             </a:fld>
             <a:endParaRPr lang="en-US"/>
           </a:p>
@@ -1773,7 +1779,7 @@
     </p:spTree>
     <p:extLst>
       <p:ext uri="{BB962C8B-B14F-4D97-AF65-F5344CB8AC3E}">
-        <p14:creationId xmlns:p14="http://schemas.microsoft.com/office/powerpoint/2010/main" val="1645790774"/>
+        <p14:creationId xmlns:p14="http://schemas.microsoft.com/office/powerpoint/2010/main" val="4245154378"/>
       </p:ext>
     </p:extLst>
   </p:cSld>
@@ -1817,7 +1823,7 @@
           <a:p>
             <a:fld id="{784600EB-327D-4924-BA30-06E361308E99}" type="datetimeFigureOut">
               <a:rPr lang="en-US" smtClean="0"/>
-              <a:t>12/22/2020</a:t>
+              <a:t>12/23/2020</a:t>
             </a:fld>
             <a:endParaRPr lang="en-US"/>
           </a:p>
@@ -1868,7 +1874,7 @@
     </p:spTree>
     <p:extLst>
       <p:ext uri="{BB962C8B-B14F-4D97-AF65-F5344CB8AC3E}">
-        <p14:creationId xmlns:p14="http://schemas.microsoft.com/office/powerpoint/2010/main" val="1688641353"/>
+        <p14:creationId xmlns:p14="http://schemas.microsoft.com/office/powerpoint/2010/main" val="1247732431"/>
       </p:ext>
     </p:extLst>
   </p:cSld>
@@ -1907,15 +1913,15 @@
         </p:nvSpPr>
         <p:spPr>
           <a:xfrm>
-            <a:off x="566857" y="213360"/>
-            <a:ext cx="2654260" cy="746760"/>
+            <a:off x="503873" y="152400"/>
+            <a:ext cx="2359342" cy="533400"/>
           </a:xfrm>
         </p:spPr>
         <p:txBody>
           <a:bodyPr anchor="b"/>
           <a:lstStyle>
             <a:lvl1pPr>
-              <a:defRPr sz="1493"/>
+              <a:defRPr sz="1067"/>
             </a:lvl1pPr>
           </a:lstStyle>
           <a:p>
@@ -1939,39 +1945,39 @@
         </p:nvSpPr>
         <p:spPr>
           <a:xfrm>
-            <a:off x="3498652" y="460799"/>
-            <a:ext cx="4166235" cy="2274358"/>
+            <a:off x="3109913" y="329142"/>
+            <a:ext cx="3703320" cy="1624542"/>
           </a:xfrm>
         </p:spPr>
         <p:txBody>
           <a:bodyPr/>
           <a:lstStyle>
             <a:lvl1pPr>
-              <a:defRPr sz="1493"/>
+              <a:defRPr sz="1067"/>
             </a:lvl1pPr>
             <a:lvl2pPr>
-              <a:defRPr sz="1307"/>
+              <a:defRPr sz="933"/>
             </a:lvl2pPr>
             <a:lvl3pPr>
-              <a:defRPr sz="1120"/>
+              <a:defRPr sz="800"/>
             </a:lvl3pPr>
             <a:lvl4pPr>
-              <a:defRPr sz="933"/>
+              <a:defRPr sz="667"/>
             </a:lvl4pPr>
             <a:lvl5pPr>
-              <a:defRPr sz="933"/>
+              <a:defRPr sz="667"/>
             </a:lvl5pPr>
             <a:lvl6pPr>
-              <a:defRPr sz="933"/>
+              <a:defRPr sz="667"/>
             </a:lvl6pPr>
             <a:lvl7pPr>
-              <a:defRPr sz="933"/>
+              <a:defRPr sz="667"/>
             </a:lvl7pPr>
             <a:lvl8pPr>
-              <a:defRPr sz="933"/>
+              <a:defRPr sz="667"/>
             </a:lvl8pPr>
             <a:lvl9pPr>
-              <a:defRPr sz="933"/>
+              <a:defRPr sz="667"/>
             </a:lvl9pPr>
           </a:lstStyle>
           <a:p>
@@ -2024,8 +2030,8 @@
         </p:nvSpPr>
         <p:spPr>
           <a:xfrm>
-            <a:off x="566857" y="960120"/>
-            <a:ext cx="2654260" cy="1778741"/>
+            <a:off x="503873" y="685800"/>
+            <a:ext cx="2359342" cy="1270529"/>
           </a:xfrm>
         </p:spPr>
         <p:txBody>
@@ -2033,39 +2039,39 @@
           <a:lstStyle>
             <a:lvl1pPr marL="0" indent="0">
               <a:buNone/>
-              <a:defRPr sz="747"/>
+              <a:defRPr sz="533"/>
             </a:lvl1pPr>
-            <a:lvl2pPr marL="213375" indent="0">
-              <a:buNone/>
-              <a:defRPr sz="653"/>
+            <a:lvl2pPr marL="152385" indent="0">
+              <a:buNone/>
+              <a:defRPr sz="467"/>
             </a:lvl2pPr>
-            <a:lvl3pPr marL="426750" indent="0">
-              <a:buNone/>
-              <a:defRPr sz="560"/>
+            <a:lvl3pPr marL="304770" indent="0">
+              <a:buNone/>
+              <a:defRPr sz="400"/>
             </a:lvl3pPr>
-            <a:lvl4pPr marL="640126" indent="0">
-              <a:buNone/>
-              <a:defRPr sz="467"/>
+            <a:lvl4pPr marL="457154" indent="0">
+              <a:buNone/>
+              <a:defRPr sz="333"/>
             </a:lvl4pPr>
-            <a:lvl5pPr marL="853501" indent="0">
-              <a:buNone/>
-              <a:defRPr sz="467"/>
+            <a:lvl5pPr marL="609539" indent="0">
+              <a:buNone/>
+              <a:defRPr sz="333"/>
             </a:lvl5pPr>
-            <a:lvl6pPr marL="1066876" indent="0">
-              <a:buNone/>
-              <a:defRPr sz="467"/>
+            <a:lvl6pPr marL="761924" indent="0">
+              <a:buNone/>
+              <a:defRPr sz="333"/>
             </a:lvl6pPr>
-            <a:lvl7pPr marL="1280251" indent="0">
-              <a:buNone/>
-              <a:defRPr sz="467"/>
+            <a:lvl7pPr marL="914309" indent="0">
+              <a:buNone/>
+              <a:defRPr sz="333"/>
             </a:lvl7pPr>
-            <a:lvl8pPr marL="1493627" indent="0">
-              <a:buNone/>
-              <a:defRPr sz="467"/>
+            <a:lvl8pPr marL="1066693" indent="0">
+              <a:buNone/>
+              <a:defRPr sz="333"/>
             </a:lvl8pPr>
-            <a:lvl9pPr marL="1707002" indent="0">
-              <a:buNone/>
-              <a:defRPr sz="467"/>
+            <a:lvl9pPr marL="1219078" indent="0">
+              <a:buNone/>
+              <a:defRPr sz="333"/>
             </a:lvl9pPr>
           </a:lstStyle>
           <a:p>
@@ -2094,7 +2100,7 @@
           <a:p>
             <a:fld id="{784600EB-327D-4924-BA30-06E361308E99}" type="datetimeFigureOut">
               <a:rPr lang="en-US" smtClean="0"/>
-              <a:t>12/22/2020</a:t>
+              <a:t>12/23/2020</a:t>
             </a:fld>
             <a:endParaRPr lang="en-US"/>
           </a:p>
@@ -2145,7 +2151,7 @@
     </p:spTree>
     <p:extLst>
       <p:ext uri="{BB962C8B-B14F-4D97-AF65-F5344CB8AC3E}">
-        <p14:creationId xmlns:p14="http://schemas.microsoft.com/office/powerpoint/2010/main" val="3512328020"/>
+        <p14:creationId xmlns:p14="http://schemas.microsoft.com/office/powerpoint/2010/main" val="1259494835"/>
       </p:ext>
     </p:extLst>
   </p:cSld>
@@ -2184,15 +2190,15 @@
         </p:nvSpPr>
         <p:spPr>
           <a:xfrm>
-            <a:off x="566857" y="213360"/>
-            <a:ext cx="2654260" cy="746760"/>
+            <a:off x="503873" y="152400"/>
+            <a:ext cx="2359342" cy="533400"/>
           </a:xfrm>
         </p:spPr>
         <p:txBody>
           <a:bodyPr anchor="b"/>
           <a:lstStyle>
             <a:lvl1pPr>
-              <a:defRPr sz="1493"/>
+              <a:defRPr sz="1067"/>
             </a:lvl1pPr>
           </a:lstStyle>
           <a:p>
@@ -2216,8 +2222,8 @@
         </p:nvSpPr>
         <p:spPr>
           <a:xfrm>
-            <a:off x="3498652" y="460799"/>
-            <a:ext cx="4166235" cy="2274358"/>
+            <a:off x="3109913" y="329142"/>
+            <a:ext cx="3703320" cy="1624542"/>
           </a:xfrm>
         </p:spPr>
         <p:txBody>
@@ -2225,39 +2231,39 @@
           <a:lstStyle>
             <a:lvl1pPr marL="0" indent="0">
               <a:buNone/>
-              <a:defRPr sz="1493"/>
+              <a:defRPr sz="1067"/>
             </a:lvl1pPr>
-            <a:lvl2pPr marL="213375" indent="0">
-              <a:buNone/>
-              <a:defRPr sz="1307"/>
+            <a:lvl2pPr marL="152385" indent="0">
+              <a:buNone/>
+              <a:defRPr sz="933"/>
             </a:lvl2pPr>
-            <a:lvl3pPr marL="426750" indent="0">
-              <a:buNone/>
-              <a:defRPr sz="1120"/>
+            <a:lvl3pPr marL="304770" indent="0">
+              <a:buNone/>
+              <a:defRPr sz="800"/>
             </a:lvl3pPr>
-            <a:lvl4pPr marL="640126" indent="0">
-              <a:buNone/>
-              <a:defRPr sz="933"/>
+            <a:lvl4pPr marL="457154" indent="0">
+              <a:buNone/>
+              <a:defRPr sz="667"/>
             </a:lvl4pPr>
-            <a:lvl5pPr marL="853501" indent="0">
-              <a:buNone/>
-              <a:defRPr sz="933"/>
+            <a:lvl5pPr marL="609539" indent="0">
+              <a:buNone/>
+              <a:defRPr sz="667"/>
             </a:lvl5pPr>
-            <a:lvl6pPr marL="1066876" indent="0">
-              <a:buNone/>
-              <a:defRPr sz="933"/>
+            <a:lvl6pPr marL="761924" indent="0">
+              <a:buNone/>
+              <a:defRPr sz="667"/>
             </a:lvl6pPr>
-            <a:lvl7pPr marL="1280251" indent="0">
-              <a:buNone/>
-              <a:defRPr sz="933"/>
+            <a:lvl7pPr marL="914309" indent="0">
+              <a:buNone/>
+              <a:defRPr sz="667"/>
             </a:lvl7pPr>
-            <a:lvl8pPr marL="1493627" indent="0">
-              <a:buNone/>
-              <a:defRPr sz="933"/>
+            <a:lvl8pPr marL="1066693" indent="0">
+              <a:buNone/>
+              <a:defRPr sz="667"/>
             </a:lvl8pPr>
-            <a:lvl9pPr marL="1707002" indent="0">
-              <a:buNone/>
-              <a:defRPr sz="933"/>
+            <a:lvl9pPr marL="1219078" indent="0">
+              <a:buNone/>
+              <a:defRPr sz="667"/>
             </a:lvl9pPr>
           </a:lstStyle>
           <a:p>
@@ -2281,8 +2287,8 @@
         </p:nvSpPr>
         <p:spPr>
           <a:xfrm>
-            <a:off x="566857" y="960120"/>
-            <a:ext cx="2654260" cy="1778741"/>
+            <a:off x="503873" y="685800"/>
+            <a:ext cx="2359342" cy="1270529"/>
           </a:xfrm>
         </p:spPr>
         <p:txBody>
@@ -2290,39 +2296,39 @@
           <a:lstStyle>
             <a:lvl1pPr marL="0" indent="0">
               <a:buNone/>
-              <a:defRPr sz="747"/>
+              <a:defRPr sz="533"/>
             </a:lvl1pPr>
-            <a:lvl2pPr marL="213375" indent="0">
-              <a:buNone/>
-              <a:defRPr sz="653"/>
+            <a:lvl2pPr marL="152385" indent="0">
+              <a:buNone/>
+              <a:defRPr sz="467"/>
             </a:lvl2pPr>
-            <a:lvl3pPr marL="426750" indent="0">
-              <a:buNone/>
-              <a:defRPr sz="560"/>
+            <a:lvl3pPr marL="304770" indent="0">
+              <a:buNone/>
+              <a:defRPr sz="400"/>
             </a:lvl3pPr>
-            <a:lvl4pPr marL="640126" indent="0">
-              <a:buNone/>
-              <a:defRPr sz="467"/>
+            <a:lvl4pPr marL="457154" indent="0">
+              <a:buNone/>
+              <a:defRPr sz="333"/>
             </a:lvl4pPr>
-            <a:lvl5pPr marL="853501" indent="0">
-              <a:buNone/>
-              <a:defRPr sz="467"/>
+            <a:lvl5pPr marL="609539" indent="0">
+              <a:buNone/>
+              <a:defRPr sz="333"/>
             </a:lvl5pPr>
-            <a:lvl6pPr marL="1066876" indent="0">
-              <a:buNone/>
-              <a:defRPr sz="467"/>
+            <a:lvl6pPr marL="761924" indent="0">
+              <a:buNone/>
+              <a:defRPr sz="333"/>
             </a:lvl6pPr>
-            <a:lvl7pPr marL="1280251" indent="0">
-              <a:buNone/>
-              <a:defRPr sz="467"/>
+            <a:lvl7pPr marL="914309" indent="0">
+              <a:buNone/>
+              <a:defRPr sz="333"/>
             </a:lvl7pPr>
-            <a:lvl8pPr marL="1493627" indent="0">
-              <a:buNone/>
-              <a:defRPr sz="467"/>
+            <a:lvl8pPr marL="1066693" indent="0">
+              <a:buNone/>
+              <a:defRPr sz="333"/>
             </a:lvl8pPr>
-            <a:lvl9pPr marL="1707002" indent="0">
-              <a:buNone/>
-              <a:defRPr sz="467"/>
+            <a:lvl9pPr marL="1219078" indent="0">
+              <a:buNone/>
+              <a:defRPr sz="333"/>
             </a:lvl9pPr>
           </a:lstStyle>
           <a:p>
@@ -2351,7 +2357,7 @@
           <a:p>
             <a:fld id="{784600EB-327D-4924-BA30-06E361308E99}" type="datetimeFigureOut">
               <a:rPr lang="en-US" smtClean="0"/>
-              <a:t>12/22/2020</a:t>
+              <a:t>12/23/2020</a:t>
             </a:fld>
             <a:endParaRPr lang="en-US"/>
           </a:p>
@@ -2402,7 +2408,7 @@
     </p:spTree>
     <p:extLst>
       <p:ext uri="{BB962C8B-B14F-4D97-AF65-F5344CB8AC3E}">
-        <p14:creationId xmlns:p14="http://schemas.microsoft.com/office/powerpoint/2010/main" val="3883286836"/>
+        <p14:creationId xmlns:p14="http://schemas.microsoft.com/office/powerpoint/2010/main" val="2488306401"/>
       </p:ext>
     </p:extLst>
   </p:cSld>
@@ -2446,8 +2452,8 @@
         </p:nvSpPr>
         <p:spPr>
           <a:xfrm>
-            <a:off x="565785" y="170392"/>
-            <a:ext cx="7098030" cy="618596"/>
+            <a:off x="502920" y="121709"/>
+            <a:ext cx="6309360" cy="441854"/>
           </a:xfrm>
           <a:prstGeom prst="rect">
             <a:avLst/>
@@ -2479,8 +2485,8 @@
         </p:nvSpPr>
         <p:spPr>
           <a:xfrm>
-            <a:off x="565785" y="851959"/>
-            <a:ext cx="7098030" cy="2030624"/>
+            <a:off x="502920" y="608542"/>
+            <a:ext cx="6309360" cy="1450446"/>
           </a:xfrm>
           <a:prstGeom prst="rect">
             <a:avLst/>
@@ -2541,8 +2547,8 @@
         </p:nvSpPr>
         <p:spPr>
           <a:xfrm>
-            <a:off x="565785" y="2966297"/>
-            <a:ext cx="1851660" cy="170392"/>
+            <a:off x="502920" y="2118784"/>
+            <a:ext cx="1645920" cy="121708"/>
           </a:xfrm>
           <a:prstGeom prst="rect">
             <a:avLst/>
@@ -2552,7 +2558,7 @@
           <a:bodyPr vert="horz" lIns="91440" tIns="45720" rIns="91440" bIns="45720" rtlCol="0" anchor="ctr"/>
           <a:lstStyle>
             <a:lvl1pPr algn="l">
-              <a:defRPr sz="560">
+              <a:defRPr sz="400">
                 <a:solidFill>
                   <a:schemeClr val="tx1">
                     <a:tint val="75000"/>
@@ -2564,7 +2570,7 @@
           <a:p>
             <a:fld id="{784600EB-327D-4924-BA30-06E361308E99}" type="datetimeFigureOut">
               <a:rPr lang="en-US" smtClean="0"/>
-              <a:t>12/22/2020</a:t>
+              <a:t>12/23/2020</a:t>
             </a:fld>
             <a:endParaRPr lang="en-US"/>
           </a:p>
@@ -2582,8 +2588,8 @@
         </p:nvSpPr>
         <p:spPr>
           <a:xfrm>
-            <a:off x="2726055" y="2966297"/>
-            <a:ext cx="2777490" cy="170392"/>
+            <a:off x="2423160" y="2118784"/>
+            <a:ext cx="2468880" cy="121708"/>
           </a:xfrm>
           <a:prstGeom prst="rect">
             <a:avLst/>
@@ -2593,7 +2599,7 @@
           <a:bodyPr vert="horz" lIns="91440" tIns="45720" rIns="91440" bIns="45720" rtlCol="0" anchor="ctr"/>
           <a:lstStyle>
             <a:lvl1pPr algn="ctr">
-              <a:defRPr sz="560">
+              <a:defRPr sz="400">
                 <a:solidFill>
                   <a:schemeClr val="tx1">
                     <a:tint val="75000"/>
@@ -2619,8 +2625,8 @@
         </p:nvSpPr>
         <p:spPr>
           <a:xfrm>
-            <a:off x="5812155" y="2966297"/>
-            <a:ext cx="1851660" cy="170392"/>
+            <a:off x="5166360" y="2118784"/>
+            <a:ext cx="1645920" cy="121708"/>
           </a:xfrm>
           <a:prstGeom prst="rect">
             <a:avLst/>
@@ -2630,7 +2636,7 @@
           <a:bodyPr vert="horz" lIns="91440" tIns="45720" rIns="91440" bIns="45720" rtlCol="0" anchor="ctr"/>
           <a:lstStyle>
             <a:lvl1pPr algn="r">
-              <a:defRPr sz="560">
+              <a:defRPr sz="400">
                 <a:solidFill>
                   <a:schemeClr val="tx1">
                     <a:tint val="75000"/>
@@ -2651,27 +2657,27 @@
     </p:spTree>
     <p:extLst>
       <p:ext uri="{BB962C8B-B14F-4D97-AF65-F5344CB8AC3E}">
-        <p14:creationId xmlns:p14="http://schemas.microsoft.com/office/powerpoint/2010/main" val="1071957255"/>
+        <p14:creationId xmlns:p14="http://schemas.microsoft.com/office/powerpoint/2010/main" val="2372043869"/>
       </p:ext>
     </p:extLst>
   </p:cSld>
   <p:clrMap bg1="lt1" tx1="dk1" bg2="lt2" tx2="dk2" accent1="accent1" accent2="accent2" accent3="accent3" accent4="accent4" accent5="accent5" accent6="accent6" hlink="hlink" folHlink="folHlink"/>
   <p:sldLayoutIdLst>
-    <p:sldLayoutId id="2147483697" r:id="rId1"/>
-    <p:sldLayoutId id="2147483698" r:id="rId2"/>
-    <p:sldLayoutId id="2147483699" r:id="rId3"/>
-    <p:sldLayoutId id="2147483700" r:id="rId4"/>
-    <p:sldLayoutId id="2147483701" r:id="rId5"/>
-    <p:sldLayoutId id="2147483702" r:id="rId6"/>
-    <p:sldLayoutId id="2147483703" r:id="rId7"/>
-    <p:sldLayoutId id="2147483704" r:id="rId8"/>
-    <p:sldLayoutId id="2147483705" r:id="rId9"/>
-    <p:sldLayoutId id="2147483706" r:id="rId10"/>
-    <p:sldLayoutId id="2147483707" r:id="rId11"/>
+    <p:sldLayoutId id="2147483733" r:id="rId1"/>
+    <p:sldLayoutId id="2147483734" r:id="rId2"/>
+    <p:sldLayoutId id="2147483735" r:id="rId3"/>
+    <p:sldLayoutId id="2147483736" r:id="rId4"/>
+    <p:sldLayoutId id="2147483737" r:id="rId5"/>
+    <p:sldLayoutId id="2147483738" r:id="rId6"/>
+    <p:sldLayoutId id="2147483739" r:id="rId7"/>
+    <p:sldLayoutId id="2147483740" r:id="rId8"/>
+    <p:sldLayoutId id="2147483741" r:id="rId9"/>
+    <p:sldLayoutId id="2147483742" r:id="rId10"/>
+    <p:sldLayoutId id="2147483743" r:id="rId11"/>
   </p:sldLayoutIdLst>
   <p:txStyles>
     <p:titleStyle>
-      <a:lvl1pPr algn="l" defTabSz="426750" rtl="0" eaLnBrk="1" latinLnBrk="0" hangingPunct="1">
+      <a:lvl1pPr algn="l" defTabSz="304770" rtl="0" eaLnBrk="1" latinLnBrk="0" hangingPunct="1">
         <a:lnSpc>
           <a:spcPct val="90000"/>
         </a:lnSpc>
@@ -2679,7 +2685,7 @@
           <a:spcPct val="0"/>
         </a:spcBef>
         <a:buNone/>
-        <a:defRPr sz="2053" kern="1200">
+        <a:defRPr sz="1467" kern="1200">
           <a:solidFill>
             <a:schemeClr val="tx1"/>
           </a:solidFill>
@@ -2690,48 +2696,12 @@
       </a:lvl1pPr>
     </p:titleStyle>
     <p:bodyStyle>
-      <a:lvl1pPr marL="106688" indent="-106688" algn="l" defTabSz="426750" rtl="0" eaLnBrk="1" latinLnBrk="0" hangingPunct="1">
+      <a:lvl1pPr marL="76192" indent="-76192" algn="l" defTabSz="304770" rtl="0" eaLnBrk="1" latinLnBrk="0" hangingPunct="1">
         <a:lnSpc>
           <a:spcPct val="90000"/>
         </a:lnSpc>
         <a:spcBef>
-          <a:spcPts val="467"/>
-        </a:spcBef>
-        <a:buFont typeface="Arial" panose="020B0604020202020204" pitchFamily="34" charset="0"/>
-        <a:buChar char="•"/>
-        <a:defRPr sz="1307" kern="1200">
-          <a:solidFill>
-            <a:schemeClr val="tx1"/>
-          </a:solidFill>
-          <a:latin typeface="+mn-lt"/>
-          <a:ea typeface="+mn-ea"/>
-          <a:cs typeface="+mn-cs"/>
-        </a:defRPr>
-      </a:lvl1pPr>
-      <a:lvl2pPr marL="320063" indent="-106688" algn="l" defTabSz="426750" rtl="0" eaLnBrk="1" latinLnBrk="0" hangingPunct="1">
-        <a:lnSpc>
-          <a:spcPct val="90000"/>
-        </a:lnSpc>
-        <a:spcBef>
-          <a:spcPts val="233"/>
-        </a:spcBef>
-        <a:buFont typeface="Arial" panose="020B0604020202020204" pitchFamily="34" charset="0"/>
-        <a:buChar char="•"/>
-        <a:defRPr sz="1120" kern="1200">
-          <a:solidFill>
-            <a:schemeClr val="tx1"/>
-          </a:solidFill>
-          <a:latin typeface="+mn-lt"/>
-          <a:ea typeface="+mn-ea"/>
-          <a:cs typeface="+mn-cs"/>
-        </a:defRPr>
-      </a:lvl2pPr>
-      <a:lvl3pPr marL="533438" indent="-106688" algn="l" defTabSz="426750" rtl="0" eaLnBrk="1" latinLnBrk="0" hangingPunct="1">
-        <a:lnSpc>
-          <a:spcPct val="90000"/>
-        </a:lnSpc>
-        <a:spcBef>
-          <a:spcPts val="233"/>
+          <a:spcPts val="333"/>
         </a:spcBef>
         <a:buFont typeface="Arial" panose="020B0604020202020204" pitchFamily="34" charset="0"/>
         <a:buChar char="•"/>
@@ -2743,17 +2713,53 @@
           <a:ea typeface="+mn-ea"/>
           <a:cs typeface="+mn-cs"/>
         </a:defRPr>
-      </a:lvl3pPr>
-      <a:lvl4pPr marL="746813" indent="-106688" algn="l" defTabSz="426750" rtl="0" eaLnBrk="1" latinLnBrk="0" hangingPunct="1">
+      </a:lvl1pPr>
+      <a:lvl2pPr marL="228577" indent="-76192" algn="l" defTabSz="304770" rtl="0" eaLnBrk="1" latinLnBrk="0" hangingPunct="1">
         <a:lnSpc>
           <a:spcPct val="90000"/>
         </a:lnSpc>
         <a:spcBef>
-          <a:spcPts val="233"/>
+          <a:spcPts val="167"/>
         </a:spcBef>
         <a:buFont typeface="Arial" panose="020B0604020202020204" pitchFamily="34" charset="0"/>
         <a:buChar char="•"/>
-        <a:defRPr sz="840" kern="1200">
+        <a:defRPr sz="800" kern="1200">
+          <a:solidFill>
+            <a:schemeClr val="tx1"/>
+          </a:solidFill>
+          <a:latin typeface="+mn-lt"/>
+          <a:ea typeface="+mn-ea"/>
+          <a:cs typeface="+mn-cs"/>
+        </a:defRPr>
+      </a:lvl2pPr>
+      <a:lvl3pPr marL="380962" indent="-76192" algn="l" defTabSz="304770" rtl="0" eaLnBrk="1" latinLnBrk="0" hangingPunct="1">
+        <a:lnSpc>
+          <a:spcPct val="90000"/>
+        </a:lnSpc>
+        <a:spcBef>
+          <a:spcPts val="167"/>
+        </a:spcBef>
+        <a:buFont typeface="Arial" panose="020B0604020202020204" pitchFamily="34" charset="0"/>
+        <a:buChar char="•"/>
+        <a:defRPr sz="667" kern="1200">
+          <a:solidFill>
+            <a:schemeClr val="tx1"/>
+          </a:solidFill>
+          <a:latin typeface="+mn-lt"/>
+          <a:ea typeface="+mn-ea"/>
+          <a:cs typeface="+mn-cs"/>
+        </a:defRPr>
+      </a:lvl3pPr>
+      <a:lvl4pPr marL="533347" indent="-76192" algn="l" defTabSz="304770" rtl="0" eaLnBrk="1" latinLnBrk="0" hangingPunct="1">
+        <a:lnSpc>
+          <a:spcPct val="90000"/>
+        </a:lnSpc>
+        <a:spcBef>
+          <a:spcPts val="167"/>
+        </a:spcBef>
+        <a:buFont typeface="Arial" panose="020B0604020202020204" pitchFamily="34" charset="0"/>
+        <a:buChar char="•"/>
+        <a:defRPr sz="600" kern="1200">
           <a:solidFill>
             <a:schemeClr val="tx1"/>
           </a:solidFill>
@@ -2762,16 +2768,16 @@
           <a:cs typeface="+mn-cs"/>
         </a:defRPr>
       </a:lvl4pPr>
-      <a:lvl5pPr marL="960189" indent="-106688" algn="l" defTabSz="426750" rtl="0" eaLnBrk="1" latinLnBrk="0" hangingPunct="1">
+      <a:lvl5pPr marL="685731" indent="-76192" algn="l" defTabSz="304770" rtl="0" eaLnBrk="1" latinLnBrk="0" hangingPunct="1">
         <a:lnSpc>
           <a:spcPct val="90000"/>
         </a:lnSpc>
         <a:spcBef>
-          <a:spcPts val="233"/>
+          <a:spcPts val="167"/>
         </a:spcBef>
         <a:buFont typeface="Arial" panose="020B0604020202020204" pitchFamily="34" charset="0"/>
         <a:buChar char="•"/>
-        <a:defRPr sz="840" kern="1200">
+        <a:defRPr sz="600" kern="1200">
           <a:solidFill>
             <a:schemeClr val="tx1"/>
           </a:solidFill>
@@ -2780,16 +2786,16 @@
           <a:cs typeface="+mn-cs"/>
         </a:defRPr>
       </a:lvl5pPr>
-      <a:lvl6pPr marL="1173564" indent="-106688" algn="l" defTabSz="426750" rtl="0" eaLnBrk="1" latinLnBrk="0" hangingPunct="1">
+      <a:lvl6pPr marL="838116" indent="-76192" algn="l" defTabSz="304770" rtl="0" eaLnBrk="1" latinLnBrk="0" hangingPunct="1">
         <a:lnSpc>
           <a:spcPct val="90000"/>
         </a:lnSpc>
         <a:spcBef>
-          <a:spcPts val="233"/>
+          <a:spcPts val="167"/>
         </a:spcBef>
         <a:buFont typeface="Arial" panose="020B0604020202020204" pitchFamily="34" charset="0"/>
         <a:buChar char="•"/>
-        <a:defRPr sz="840" kern="1200">
+        <a:defRPr sz="600" kern="1200">
           <a:solidFill>
             <a:schemeClr val="tx1"/>
           </a:solidFill>
@@ -2798,16 +2804,16 @@
           <a:cs typeface="+mn-cs"/>
         </a:defRPr>
       </a:lvl6pPr>
-      <a:lvl7pPr marL="1386939" indent="-106688" algn="l" defTabSz="426750" rtl="0" eaLnBrk="1" latinLnBrk="0" hangingPunct="1">
+      <a:lvl7pPr marL="990501" indent="-76192" algn="l" defTabSz="304770" rtl="0" eaLnBrk="1" latinLnBrk="0" hangingPunct="1">
         <a:lnSpc>
           <a:spcPct val="90000"/>
         </a:lnSpc>
         <a:spcBef>
-          <a:spcPts val="233"/>
+          <a:spcPts val="167"/>
         </a:spcBef>
         <a:buFont typeface="Arial" panose="020B0604020202020204" pitchFamily="34" charset="0"/>
         <a:buChar char="•"/>
-        <a:defRPr sz="840" kern="1200">
+        <a:defRPr sz="600" kern="1200">
           <a:solidFill>
             <a:schemeClr val="tx1"/>
           </a:solidFill>
@@ -2816,16 +2822,16 @@
           <a:cs typeface="+mn-cs"/>
         </a:defRPr>
       </a:lvl7pPr>
-      <a:lvl8pPr marL="1600314" indent="-106688" algn="l" defTabSz="426750" rtl="0" eaLnBrk="1" latinLnBrk="0" hangingPunct="1">
+      <a:lvl8pPr marL="1142886" indent="-76192" algn="l" defTabSz="304770" rtl="0" eaLnBrk="1" latinLnBrk="0" hangingPunct="1">
         <a:lnSpc>
           <a:spcPct val="90000"/>
         </a:lnSpc>
         <a:spcBef>
-          <a:spcPts val="233"/>
+          <a:spcPts val="167"/>
         </a:spcBef>
         <a:buFont typeface="Arial" panose="020B0604020202020204" pitchFamily="34" charset="0"/>
         <a:buChar char="•"/>
-        <a:defRPr sz="840" kern="1200">
+        <a:defRPr sz="600" kern="1200">
           <a:solidFill>
             <a:schemeClr val="tx1"/>
           </a:solidFill>
@@ -2834,16 +2840,16 @@
           <a:cs typeface="+mn-cs"/>
         </a:defRPr>
       </a:lvl8pPr>
-      <a:lvl9pPr marL="1813690" indent="-106688" algn="l" defTabSz="426750" rtl="0" eaLnBrk="1" latinLnBrk="0" hangingPunct="1">
+      <a:lvl9pPr marL="1295270" indent="-76192" algn="l" defTabSz="304770" rtl="0" eaLnBrk="1" latinLnBrk="0" hangingPunct="1">
         <a:lnSpc>
           <a:spcPct val="90000"/>
         </a:lnSpc>
         <a:spcBef>
-          <a:spcPts val="233"/>
+          <a:spcPts val="167"/>
         </a:spcBef>
         <a:buFont typeface="Arial" panose="020B0604020202020204" pitchFamily="34" charset="0"/>
         <a:buChar char="•"/>
-        <a:defRPr sz="840" kern="1200">
+        <a:defRPr sz="600" kern="1200">
           <a:solidFill>
             <a:schemeClr val="tx1"/>
           </a:solidFill>
@@ -2857,8 +2863,8 @@
       <a:defPPr>
         <a:defRPr lang="en-US"/>
       </a:defPPr>
-      <a:lvl1pPr marL="0" algn="l" defTabSz="426750" rtl="0" eaLnBrk="1" latinLnBrk="0" hangingPunct="1">
-        <a:defRPr sz="840" kern="1200">
+      <a:lvl1pPr marL="0" algn="l" defTabSz="304770" rtl="0" eaLnBrk="1" latinLnBrk="0" hangingPunct="1">
+        <a:defRPr sz="600" kern="1200">
           <a:solidFill>
             <a:schemeClr val="tx1"/>
           </a:solidFill>
@@ -2867,8 +2873,8 @@
           <a:cs typeface="+mn-cs"/>
         </a:defRPr>
       </a:lvl1pPr>
-      <a:lvl2pPr marL="213375" algn="l" defTabSz="426750" rtl="0" eaLnBrk="1" latinLnBrk="0" hangingPunct="1">
-        <a:defRPr sz="840" kern="1200">
+      <a:lvl2pPr marL="152385" algn="l" defTabSz="304770" rtl="0" eaLnBrk="1" latinLnBrk="0" hangingPunct="1">
+        <a:defRPr sz="600" kern="1200">
           <a:solidFill>
             <a:schemeClr val="tx1"/>
           </a:solidFill>
@@ -2877,8 +2883,8 @@
           <a:cs typeface="+mn-cs"/>
         </a:defRPr>
       </a:lvl2pPr>
-      <a:lvl3pPr marL="426750" algn="l" defTabSz="426750" rtl="0" eaLnBrk="1" latinLnBrk="0" hangingPunct="1">
-        <a:defRPr sz="840" kern="1200">
+      <a:lvl3pPr marL="304770" algn="l" defTabSz="304770" rtl="0" eaLnBrk="1" latinLnBrk="0" hangingPunct="1">
+        <a:defRPr sz="600" kern="1200">
           <a:solidFill>
             <a:schemeClr val="tx1"/>
           </a:solidFill>
@@ -2887,8 +2893,8 @@
           <a:cs typeface="+mn-cs"/>
         </a:defRPr>
       </a:lvl3pPr>
-      <a:lvl4pPr marL="640126" algn="l" defTabSz="426750" rtl="0" eaLnBrk="1" latinLnBrk="0" hangingPunct="1">
-        <a:defRPr sz="840" kern="1200">
+      <a:lvl4pPr marL="457154" algn="l" defTabSz="304770" rtl="0" eaLnBrk="1" latinLnBrk="0" hangingPunct="1">
+        <a:defRPr sz="600" kern="1200">
           <a:solidFill>
             <a:schemeClr val="tx1"/>
           </a:solidFill>
@@ -2897,8 +2903,8 @@
           <a:cs typeface="+mn-cs"/>
         </a:defRPr>
       </a:lvl4pPr>
-      <a:lvl5pPr marL="853501" algn="l" defTabSz="426750" rtl="0" eaLnBrk="1" latinLnBrk="0" hangingPunct="1">
-        <a:defRPr sz="840" kern="1200">
+      <a:lvl5pPr marL="609539" algn="l" defTabSz="304770" rtl="0" eaLnBrk="1" latinLnBrk="0" hangingPunct="1">
+        <a:defRPr sz="600" kern="1200">
           <a:solidFill>
             <a:schemeClr val="tx1"/>
           </a:solidFill>
@@ -2907,8 +2913,8 @@
           <a:cs typeface="+mn-cs"/>
         </a:defRPr>
       </a:lvl5pPr>
-      <a:lvl6pPr marL="1066876" algn="l" defTabSz="426750" rtl="0" eaLnBrk="1" latinLnBrk="0" hangingPunct="1">
-        <a:defRPr sz="840" kern="1200">
+      <a:lvl6pPr marL="761924" algn="l" defTabSz="304770" rtl="0" eaLnBrk="1" latinLnBrk="0" hangingPunct="1">
+        <a:defRPr sz="600" kern="1200">
           <a:solidFill>
             <a:schemeClr val="tx1"/>
           </a:solidFill>
@@ -2917,8 +2923,8 @@
           <a:cs typeface="+mn-cs"/>
         </a:defRPr>
       </a:lvl6pPr>
-      <a:lvl7pPr marL="1280251" algn="l" defTabSz="426750" rtl="0" eaLnBrk="1" latinLnBrk="0" hangingPunct="1">
-        <a:defRPr sz="840" kern="1200">
+      <a:lvl7pPr marL="914309" algn="l" defTabSz="304770" rtl="0" eaLnBrk="1" latinLnBrk="0" hangingPunct="1">
+        <a:defRPr sz="600" kern="1200">
           <a:solidFill>
             <a:schemeClr val="tx1"/>
           </a:solidFill>
@@ -2927,8 +2933,8 @@
           <a:cs typeface="+mn-cs"/>
         </a:defRPr>
       </a:lvl7pPr>
-      <a:lvl8pPr marL="1493627" algn="l" defTabSz="426750" rtl="0" eaLnBrk="1" latinLnBrk="0" hangingPunct="1">
-        <a:defRPr sz="840" kern="1200">
+      <a:lvl8pPr marL="1066693" algn="l" defTabSz="304770" rtl="0" eaLnBrk="1" latinLnBrk="0" hangingPunct="1">
+        <a:defRPr sz="600" kern="1200">
           <a:solidFill>
             <a:schemeClr val="tx1"/>
           </a:solidFill>
@@ -2937,8 +2943,8 @@
           <a:cs typeface="+mn-cs"/>
         </a:defRPr>
       </a:lvl8pPr>
-      <a:lvl9pPr marL="1707002" algn="l" defTabSz="426750" rtl="0" eaLnBrk="1" latinLnBrk="0" hangingPunct="1">
-        <a:defRPr sz="840" kern="1200">
+      <a:lvl9pPr marL="1219078" algn="l" defTabSz="304770" rtl="0" eaLnBrk="1" latinLnBrk="0" hangingPunct="1">
+        <a:defRPr sz="600" kern="1200">
           <a:solidFill>
             <a:schemeClr val="tx1"/>
           </a:solidFill>
@@ -2983,7 +2989,7 @@
         </p:nvSpPr>
         <p:spPr>
           <a:xfrm>
-            <a:off x="477961" y="809391"/>
+            <a:off x="14411" y="78454"/>
             <a:ext cx="1526066" cy="1526066"/>
           </a:xfrm>
           <a:prstGeom prst="ellipse">
@@ -3040,7 +3046,7 @@
         </p:nvSpPr>
         <p:spPr>
           <a:xfrm>
-            <a:off x="2884658" y="985756"/>
+            <a:off x="2421113" y="254824"/>
             <a:ext cx="1173345" cy="1173345"/>
           </a:xfrm>
           <a:prstGeom prst="ellipse">
@@ -3097,7 +3103,7 @@
         </p:nvSpPr>
         <p:spPr>
           <a:xfrm>
-            <a:off x="6967737" y="1392044"/>
+            <a:off x="6504192" y="661112"/>
             <a:ext cx="360769" cy="360769"/>
           </a:xfrm>
           <a:prstGeom prst="ellipse">
@@ -3154,7 +3160,7 @@
         </p:nvSpPr>
         <p:spPr>
           <a:xfrm>
-            <a:off x="5043405" y="1179164"/>
+            <a:off x="4579860" y="448232"/>
             <a:ext cx="786529" cy="786529"/>
           </a:xfrm>
           <a:prstGeom prst="ellipse">
@@ -3199,41 +3205,6 @@
       </p:sp>
       <p:sp>
         <p:nvSpPr>
-          <p:cNvPr id="12" name="TextBox 11">
-            <a:extLst>
-              <a:ext uri="{FF2B5EF4-FFF2-40B4-BE49-F238E27FC236}">
-                <a16:creationId xmlns:a16="http://schemas.microsoft.com/office/drawing/2014/main" id="{15F33882-224F-4226-957D-7B0CCAD51982}"/>
-              </a:ext>
-            </a:extLst>
-          </p:cNvPr>
-          <p:cNvSpPr txBox="1"/>
-          <p:nvPr/>
-        </p:nvSpPr>
-        <p:spPr>
-          <a:xfrm>
-            <a:off x="3" y="23101"/>
-            <a:ext cx="7996292" cy="492443"/>
-          </a:xfrm>
-          <a:prstGeom prst="rect">
-            <a:avLst/>
-          </a:prstGeom>
-          <a:noFill/>
-        </p:spPr>
-        <p:txBody>
-          <a:bodyPr wrap="none" rtlCol="0">
-            <a:spAutoFit/>
-          </a:bodyPr>
-          <a:lstStyle/>
-          <a:p>
-            <a:r>
-              <a:rPr lang="en-US" sz="2600" dirty="0"/>
-              <a:t>Color Code for Nodes Degree (Based on Degree Quartiles)</a:t>
-            </a:r>
-          </a:p>
-        </p:txBody>
-      </p:sp>
-      <p:sp>
-        <p:nvSpPr>
           <p:cNvPr id="13" name="TextBox 12">
             <a:extLst>
               <a:ext uri="{FF2B5EF4-FFF2-40B4-BE49-F238E27FC236}">
@@ -3246,7 +3217,7 @@
         </p:nvSpPr>
         <p:spPr>
           <a:xfrm>
-            <a:off x="614861" y="2576302"/>
+            <a:off x="151311" y="1845365"/>
             <a:ext cx="1252266" cy="369332"/>
           </a:xfrm>
           <a:prstGeom prst="rect">
@@ -3289,7 +3260,7 @@
         </p:nvSpPr>
         <p:spPr>
           <a:xfrm>
-            <a:off x="2845287" y="2576302"/>
+            <a:off x="2381742" y="1845365"/>
             <a:ext cx="1251753" cy="369332"/>
           </a:xfrm>
           <a:prstGeom prst="rect">
@@ -3332,7 +3303,7 @@
         </p:nvSpPr>
         <p:spPr>
           <a:xfrm>
-            <a:off x="4767140" y="2576302"/>
+            <a:off x="4303590" y="1845365"/>
             <a:ext cx="1334020" cy="369332"/>
           </a:xfrm>
           <a:prstGeom prst="rect">
@@ -3375,7 +3346,7 @@
         </p:nvSpPr>
         <p:spPr>
           <a:xfrm>
-            <a:off x="6542667" y="2576302"/>
+            <a:off x="6079122" y="1845365"/>
             <a:ext cx="1231299" cy="369332"/>
           </a:xfrm>
           <a:prstGeom prst="rect">
@@ -3448,6 +3419,471 @@
         </p:nvSpPr>
         <p:spPr>
           <a:xfrm>
+            <a:off x="20761" y="352191"/>
+            <a:ext cx="1526066" cy="1526066"/>
+          </a:xfrm>
+          <a:prstGeom prst="ellipse">
+            <a:avLst/>
+          </a:prstGeom>
+          <a:solidFill>
+            <a:srgbClr val="345DA9"/>
+          </a:solidFill>
+          <a:ln>
+            <a:noFill/>
+          </a:ln>
+        </p:spPr>
+        <p:style>
+          <a:lnRef idx="2">
+            <a:schemeClr val="accent1">
+              <a:shade val="50000"/>
+            </a:schemeClr>
+          </a:lnRef>
+          <a:fillRef idx="1">
+            <a:schemeClr val="accent1"/>
+          </a:fillRef>
+          <a:effectRef idx="0">
+            <a:schemeClr val="accent1"/>
+          </a:effectRef>
+          <a:fontRef idx="minor">
+            <a:schemeClr val="lt1"/>
+          </a:fontRef>
+        </p:style>
+        <p:txBody>
+          <a:bodyPr rot="0" spcFirstLastPara="0" vertOverflow="overflow" horzOverflow="overflow" vert="horz" wrap="square" lIns="91440" tIns="45720" rIns="91440" bIns="45720" numCol="1" spcCol="0" rtlCol="0" fromWordArt="0" anchor="ctr" anchorCtr="0" forceAA="0" compatLnSpc="1">
+            <a:prstTxWarp prst="textNoShape">
+              <a:avLst/>
+            </a:prstTxWarp>
+            <a:noAutofit/>
+          </a:bodyPr>
+          <a:lstStyle/>
+          <a:p>
+            <a:pPr algn="ctr"/>
+            <a:endParaRPr lang="en-US"/>
+          </a:p>
+        </p:txBody>
+      </p:sp>
+      <p:sp>
+        <p:nvSpPr>
+          <p:cNvPr id="6" name="Oval 5">
+            <a:extLst>
+              <a:ext uri="{FF2B5EF4-FFF2-40B4-BE49-F238E27FC236}">
+                <a16:creationId xmlns:a16="http://schemas.microsoft.com/office/drawing/2014/main" id="{FCD27977-1622-4CD7-9F93-4DBFAC8B01AD}"/>
+              </a:ext>
+            </a:extLst>
+          </p:cNvPr>
+          <p:cNvSpPr/>
+          <p:nvPr/>
+        </p:nvSpPr>
+        <p:spPr>
+          <a:xfrm>
+            <a:off x="2427463" y="528561"/>
+            <a:ext cx="1173345" cy="1173345"/>
+          </a:xfrm>
+          <a:prstGeom prst="ellipse">
+            <a:avLst/>
+          </a:prstGeom>
+          <a:solidFill>
+            <a:srgbClr val="BCDFB1"/>
+          </a:solidFill>
+          <a:ln>
+            <a:noFill/>
+          </a:ln>
+        </p:spPr>
+        <p:style>
+          <a:lnRef idx="2">
+            <a:schemeClr val="accent1">
+              <a:shade val="50000"/>
+            </a:schemeClr>
+          </a:lnRef>
+          <a:fillRef idx="1">
+            <a:schemeClr val="accent1"/>
+          </a:fillRef>
+          <a:effectRef idx="0">
+            <a:schemeClr val="accent1"/>
+          </a:effectRef>
+          <a:fontRef idx="minor">
+            <a:schemeClr val="lt1"/>
+          </a:fontRef>
+        </p:style>
+        <p:txBody>
+          <a:bodyPr rot="0" spcFirstLastPara="0" vertOverflow="overflow" horzOverflow="overflow" vert="horz" wrap="square" lIns="91440" tIns="45720" rIns="91440" bIns="45720" numCol="1" spcCol="0" rtlCol="0" fromWordArt="0" anchor="ctr" anchorCtr="0" forceAA="0" compatLnSpc="1">
+            <a:prstTxWarp prst="textNoShape">
+              <a:avLst/>
+            </a:prstTxWarp>
+            <a:noAutofit/>
+          </a:bodyPr>
+          <a:lstStyle/>
+          <a:p>
+            <a:pPr algn="ctr"/>
+            <a:endParaRPr lang="en-US"/>
+          </a:p>
+        </p:txBody>
+      </p:sp>
+      <p:sp>
+        <p:nvSpPr>
+          <p:cNvPr id="8" name="Oval 7">
+            <a:extLst>
+              <a:ext uri="{FF2B5EF4-FFF2-40B4-BE49-F238E27FC236}">
+                <a16:creationId xmlns:a16="http://schemas.microsoft.com/office/drawing/2014/main" id="{5B7EF9DC-1F43-42F5-9386-5D59DF5F0582}"/>
+              </a:ext>
+            </a:extLst>
+          </p:cNvPr>
+          <p:cNvSpPr/>
+          <p:nvPr/>
+        </p:nvSpPr>
+        <p:spPr>
+          <a:xfrm>
+            <a:off x="6510542" y="934849"/>
+            <a:ext cx="360769" cy="360769"/>
+          </a:xfrm>
+          <a:prstGeom prst="ellipse">
+            <a:avLst/>
+          </a:prstGeom>
+          <a:solidFill>
+            <a:srgbClr val="EBE2DA"/>
+          </a:solidFill>
+          <a:ln>
+            <a:noFill/>
+          </a:ln>
+        </p:spPr>
+        <p:style>
+          <a:lnRef idx="2">
+            <a:schemeClr val="accent1">
+              <a:shade val="50000"/>
+            </a:schemeClr>
+          </a:lnRef>
+          <a:fillRef idx="1">
+            <a:schemeClr val="accent1"/>
+          </a:fillRef>
+          <a:effectRef idx="0">
+            <a:schemeClr val="accent1"/>
+          </a:effectRef>
+          <a:fontRef idx="minor">
+            <a:schemeClr val="lt1"/>
+          </a:fontRef>
+        </p:style>
+        <p:txBody>
+          <a:bodyPr rot="0" spcFirstLastPara="0" vertOverflow="overflow" horzOverflow="overflow" vert="horz" wrap="square" lIns="91440" tIns="45720" rIns="91440" bIns="45720" numCol="1" spcCol="0" rtlCol="0" fromWordArt="0" anchor="ctr" anchorCtr="0" forceAA="0" compatLnSpc="1">
+            <a:prstTxWarp prst="textNoShape">
+              <a:avLst/>
+            </a:prstTxWarp>
+            <a:noAutofit/>
+          </a:bodyPr>
+          <a:lstStyle/>
+          <a:p>
+            <a:pPr algn="ctr"/>
+            <a:endParaRPr lang="en-US"/>
+          </a:p>
+        </p:txBody>
+      </p:sp>
+      <p:sp>
+        <p:nvSpPr>
+          <p:cNvPr id="11" name="Oval 10">
+            <a:extLst>
+              <a:ext uri="{FF2B5EF4-FFF2-40B4-BE49-F238E27FC236}">
+                <a16:creationId xmlns:a16="http://schemas.microsoft.com/office/drawing/2014/main" id="{FBC685DF-55EA-4700-9501-B2719731952B}"/>
+              </a:ext>
+            </a:extLst>
+          </p:cNvPr>
+          <p:cNvSpPr/>
+          <p:nvPr/>
+        </p:nvSpPr>
+        <p:spPr>
+          <a:xfrm>
+            <a:off x="4586210" y="721969"/>
+            <a:ext cx="786529" cy="786529"/>
+          </a:xfrm>
+          <a:prstGeom prst="ellipse">
+            <a:avLst/>
+          </a:prstGeom>
+          <a:solidFill>
+            <a:srgbClr val="FAFACE"/>
+          </a:solidFill>
+          <a:ln>
+            <a:noFill/>
+          </a:ln>
+        </p:spPr>
+        <p:style>
+          <a:lnRef idx="2">
+            <a:schemeClr val="accent1">
+              <a:shade val="50000"/>
+            </a:schemeClr>
+          </a:lnRef>
+          <a:fillRef idx="1">
+            <a:schemeClr val="accent1"/>
+          </a:fillRef>
+          <a:effectRef idx="0">
+            <a:schemeClr val="accent1"/>
+          </a:effectRef>
+          <a:fontRef idx="minor">
+            <a:schemeClr val="lt1"/>
+          </a:fontRef>
+        </p:style>
+        <p:txBody>
+          <a:bodyPr rot="0" spcFirstLastPara="0" vertOverflow="overflow" horzOverflow="overflow" vert="horz" wrap="square" lIns="91440" tIns="45720" rIns="91440" bIns="45720" numCol="1" spcCol="0" rtlCol="0" fromWordArt="0" anchor="ctr" anchorCtr="0" forceAA="0" compatLnSpc="1">
+            <a:prstTxWarp prst="textNoShape">
+              <a:avLst/>
+            </a:prstTxWarp>
+            <a:noAutofit/>
+          </a:bodyPr>
+          <a:lstStyle/>
+          <a:p>
+            <a:pPr algn="ctr"/>
+            <a:endParaRPr lang="en-US"/>
+          </a:p>
+        </p:txBody>
+      </p:sp>
+      <p:sp>
+        <p:nvSpPr>
+          <p:cNvPr id="12" name="TextBox 11">
+            <a:extLst>
+              <a:ext uri="{FF2B5EF4-FFF2-40B4-BE49-F238E27FC236}">
+                <a16:creationId xmlns:a16="http://schemas.microsoft.com/office/drawing/2014/main" id="{15F33882-224F-4226-957D-7B0CCAD51982}"/>
+              </a:ext>
+            </a:extLst>
+          </p:cNvPr>
+          <p:cNvSpPr txBox="1"/>
+          <p:nvPr/>
+        </p:nvSpPr>
+        <p:spPr>
+          <a:xfrm>
+            <a:off x="-457197" y="-434099"/>
+            <a:ext cx="7996292" cy="492443"/>
+          </a:xfrm>
+          <a:prstGeom prst="rect">
+            <a:avLst/>
+          </a:prstGeom>
+          <a:noFill/>
+        </p:spPr>
+        <p:txBody>
+          <a:bodyPr wrap="none" rtlCol="0">
+            <a:spAutoFit/>
+          </a:bodyPr>
+          <a:lstStyle/>
+          <a:p>
+            <a:r>
+              <a:rPr lang="en-US" sz="2600" dirty="0"/>
+              <a:t>Color Code for Nodes Degree (Based on Degree Quartiles)</a:t>
+            </a:r>
+          </a:p>
+        </p:txBody>
+      </p:sp>
+      <p:sp>
+        <p:nvSpPr>
+          <p:cNvPr id="13" name="TextBox 12">
+            <a:extLst>
+              <a:ext uri="{FF2B5EF4-FFF2-40B4-BE49-F238E27FC236}">
+                <a16:creationId xmlns:a16="http://schemas.microsoft.com/office/drawing/2014/main" id="{EFF7052D-64C3-4E14-8F7E-20636BF45521}"/>
+              </a:ext>
+            </a:extLst>
+          </p:cNvPr>
+          <p:cNvSpPr txBox="1"/>
+          <p:nvPr/>
+        </p:nvSpPr>
+        <p:spPr>
+          <a:xfrm>
+            <a:off x="157661" y="2119102"/>
+            <a:ext cx="1252266" cy="369332"/>
+          </a:xfrm>
+          <a:prstGeom prst="rect">
+            <a:avLst/>
+          </a:prstGeom>
+          <a:noFill/>
+        </p:spPr>
+        <p:txBody>
+          <a:bodyPr wrap="none" rtlCol="0">
+            <a:spAutoFit/>
+          </a:bodyPr>
+          <a:lstStyle/>
+          <a:p>
+            <a:r>
+              <a:rPr lang="en-US" dirty="0"/>
+              <a:t>4</a:t>
+            </a:r>
+            <a:r>
+              <a:rPr lang="en-US" baseline="30000" dirty="0"/>
+              <a:t>th</a:t>
+            </a:r>
+            <a:r>
+              <a:rPr lang="en-US" dirty="0"/>
+              <a:t> Quartile</a:t>
+            </a:r>
+          </a:p>
+        </p:txBody>
+      </p:sp>
+      <p:sp>
+        <p:nvSpPr>
+          <p:cNvPr id="14" name="TextBox 13">
+            <a:extLst>
+              <a:ext uri="{FF2B5EF4-FFF2-40B4-BE49-F238E27FC236}">
+                <a16:creationId xmlns:a16="http://schemas.microsoft.com/office/drawing/2014/main" id="{44B21DA7-C6D9-4499-9940-009037D4193F}"/>
+              </a:ext>
+            </a:extLst>
+          </p:cNvPr>
+          <p:cNvSpPr txBox="1"/>
+          <p:nvPr/>
+        </p:nvSpPr>
+        <p:spPr>
+          <a:xfrm>
+            <a:off x="2388092" y="2119102"/>
+            <a:ext cx="1251753" cy="369332"/>
+          </a:xfrm>
+          <a:prstGeom prst="rect">
+            <a:avLst/>
+          </a:prstGeom>
+          <a:noFill/>
+        </p:spPr>
+        <p:txBody>
+          <a:bodyPr wrap="none" rtlCol="0">
+            <a:spAutoFit/>
+          </a:bodyPr>
+          <a:lstStyle/>
+          <a:p>
+            <a:r>
+              <a:rPr lang="en-US" dirty="0"/>
+              <a:t>3</a:t>
+            </a:r>
+            <a:r>
+              <a:rPr lang="en-US" baseline="30000" dirty="0"/>
+              <a:t>rd</a:t>
+            </a:r>
+            <a:r>
+              <a:rPr lang="en-US" dirty="0"/>
+              <a:t> Quartile</a:t>
+            </a:r>
+          </a:p>
+        </p:txBody>
+      </p:sp>
+      <p:sp>
+        <p:nvSpPr>
+          <p:cNvPr id="15" name="TextBox 14">
+            <a:extLst>
+              <a:ext uri="{FF2B5EF4-FFF2-40B4-BE49-F238E27FC236}">
+                <a16:creationId xmlns:a16="http://schemas.microsoft.com/office/drawing/2014/main" id="{9BFA2EED-167D-4F8B-975B-18FFE9A9F139}"/>
+              </a:ext>
+            </a:extLst>
+          </p:cNvPr>
+          <p:cNvSpPr txBox="1"/>
+          <p:nvPr/>
+        </p:nvSpPr>
+        <p:spPr>
+          <a:xfrm>
+            <a:off x="4309940" y="2119102"/>
+            <a:ext cx="1334020" cy="369332"/>
+          </a:xfrm>
+          <a:prstGeom prst="rect">
+            <a:avLst/>
+          </a:prstGeom>
+          <a:noFill/>
+        </p:spPr>
+        <p:txBody>
+          <a:bodyPr wrap="none" rtlCol="0">
+            <a:spAutoFit/>
+          </a:bodyPr>
+          <a:lstStyle/>
+          <a:p>
+            <a:r>
+              <a:rPr lang="en-US" dirty="0"/>
+              <a:t>2</a:t>
+            </a:r>
+            <a:r>
+              <a:rPr lang="en-US" baseline="30000" dirty="0"/>
+              <a:t>nd</a:t>
+            </a:r>
+            <a:r>
+              <a:rPr lang="en-US" dirty="0"/>
+              <a:t>  Quartile</a:t>
+            </a:r>
+          </a:p>
+        </p:txBody>
+      </p:sp>
+      <p:sp>
+        <p:nvSpPr>
+          <p:cNvPr id="16" name="TextBox 15">
+            <a:extLst>
+              <a:ext uri="{FF2B5EF4-FFF2-40B4-BE49-F238E27FC236}">
+                <a16:creationId xmlns:a16="http://schemas.microsoft.com/office/drawing/2014/main" id="{C219297A-C434-4583-B78A-782AF1FFA64D}"/>
+              </a:ext>
+            </a:extLst>
+          </p:cNvPr>
+          <p:cNvSpPr txBox="1"/>
+          <p:nvPr/>
+        </p:nvSpPr>
+        <p:spPr>
+          <a:xfrm>
+            <a:off x="6085472" y="2119102"/>
+            <a:ext cx="1231299" cy="369332"/>
+          </a:xfrm>
+          <a:prstGeom prst="rect">
+            <a:avLst/>
+          </a:prstGeom>
+          <a:noFill/>
+        </p:spPr>
+        <p:txBody>
+          <a:bodyPr wrap="none" rtlCol="0">
+            <a:spAutoFit/>
+          </a:bodyPr>
+          <a:lstStyle/>
+          <a:p>
+            <a:r>
+              <a:rPr lang="en-US" dirty="0"/>
+              <a:t>1</a:t>
+            </a:r>
+            <a:r>
+              <a:rPr lang="en-US" baseline="30000" dirty="0"/>
+              <a:t>st</a:t>
+            </a:r>
+            <a:r>
+              <a:rPr lang="en-US" dirty="0"/>
+              <a:t> Quartile</a:t>
+            </a:r>
+          </a:p>
+        </p:txBody>
+      </p:sp>
+    </p:spTree>
+    <p:extLst>
+      <p:ext uri="{BB962C8B-B14F-4D97-AF65-F5344CB8AC3E}">
+        <p14:creationId xmlns:p14="http://schemas.microsoft.com/office/powerpoint/2010/main" val="3523448172"/>
+      </p:ext>
+    </p:extLst>
+  </p:cSld>
+  <p:clrMapOvr>
+    <a:masterClrMapping/>
+  </p:clrMapOvr>
+</p:sld>
+</file>
+
+<file path=ppt/slides/slide3.xml><?xml version="1.0" encoding="utf-8"?>
+<p:sld xmlns:a="http://schemas.openxmlformats.org/drawingml/2006/main" xmlns:r="http://schemas.openxmlformats.org/officeDocument/2006/relationships" xmlns:p="http://schemas.openxmlformats.org/presentationml/2006/main">
+  <p:cSld>
+    <p:spTree>
+      <p:nvGrpSpPr>
+        <p:cNvPr id="1" name=""/>
+        <p:cNvGrpSpPr/>
+        <p:nvPr/>
+      </p:nvGrpSpPr>
+      <p:grpSpPr>
+        <a:xfrm>
+          <a:off x="0" y="0"/>
+          <a:ext cx="0" cy="0"/>
+          <a:chOff x="0" y="0"/>
+          <a:chExt cx="0" cy="0"/>
+        </a:xfrm>
+      </p:grpSpPr>
+      <p:sp>
+        <p:nvSpPr>
+          <p:cNvPr id="4" name="Oval 3">
+            <a:extLst>
+              <a:ext uri="{FF2B5EF4-FFF2-40B4-BE49-F238E27FC236}">
+                <a16:creationId xmlns:a16="http://schemas.microsoft.com/office/drawing/2014/main" id="{C0D32EB5-D7E3-45E1-984B-A42D467A4809}"/>
+              </a:ext>
+            </a:extLst>
+          </p:cNvPr>
+          <p:cNvSpPr/>
+          <p:nvPr/>
+        </p:nvSpPr>
+        <p:spPr>
+          <a:xfrm>
             <a:off x="-1459391" y="-1581065"/>
             <a:ext cx="1173345" cy="1173345"/>
           </a:xfrm>
@@ -3513,7 +3949,7 @@
         </p:blipFill>
         <p:spPr>
           <a:xfrm>
-            <a:off x="631009" y="-1828800"/>
+            <a:off x="173809" y="-2286000"/>
             <a:ext cx="6967582" cy="6858000"/>
           </a:xfrm>
           <a:prstGeom prst="rect">
@@ -3535,7 +3971,7 @@
         </p:nvSpPr>
         <p:spPr>
           <a:xfrm>
-            <a:off x="-1352549" y="-476164"/>
+            <a:off x="-1352549" y="-933364"/>
             <a:ext cx="1173345" cy="1173345"/>
           </a:xfrm>
           <a:prstGeom prst="ellipse">
@@ -3592,7 +4028,7 @@
         </p:nvSpPr>
         <p:spPr>
           <a:xfrm>
-            <a:off x="-1352549" y="1969909"/>
+            <a:off x="-1352549" y="1512712"/>
             <a:ext cx="1173345" cy="1173345"/>
           </a:xfrm>
           <a:prstGeom prst="ellipse">
@@ -3649,7 +4085,7 @@
         </p:nvSpPr>
         <p:spPr>
           <a:xfrm>
-            <a:off x="8049810" y="-116067"/>
+            <a:off x="7592613" y="-573267"/>
             <a:ext cx="1173345" cy="1173345"/>
           </a:xfrm>
           <a:prstGeom prst="ellipse">
@@ -3706,7 +4142,7 @@
         </p:nvSpPr>
         <p:spPr>
           <a:xfrm>
-            <a:off x="-1352550" y="3408184"/>
+            <a:off x="-1352550" y="2493784"/>
             <a:ext cx="1173345" cy="1173345"/>
           </a:xfrm>
           <a:prstGeom prst="ellipse">

</xml_diff>